<commit_message>
updates to K-means...now 4 clusters
</commit_message>
<xml_diff>
--- a/writeups/high level overview and approach doc/Presentation1.pptx
+++ b/writeups/high level overview and approach doc/Presentation1.pptx
@@ -244,7 +244,7 @@
           <a:p>
             <a:fld id="{4CDFA81C-CAC3-4C3D-B082-B3E3AE4B931F}" type="datetimeFigureOut">
               <a:rPr lang="en-ZA" smtClean="0"/>
-              <a:t>2021/08/24</a:t>
+              <a:t>2022/03/16</a:t>
             </a:fld>
             <a:endParaRPr lang="en-ZA"/>
           </a:p>
@@ -414,7 +414,7 @@
           <a:p>
             <a:fld id="{4CDFA81C-CAC3-4C3D-B082-B3E3AE4B931F}" type="datetimeFigureOut">
               <a:rPr lang="en-ZA" smtClean="0"/>
-              <a:t>2021/08/24</a:t>
+              <a:t>2022/03/16</a:t>
             </a:fld>
             <a:endParaRPr lang="en-ZA"/>
           </a:p>
@@ -594,7 +594,7 @@
           <a:p>
             <a:fld id="{4CDFA81C-CAC3-4C3D-B082-B3E3AE4B931F}" type="datetimeFigureOut">
               <a:rPr lang="en-ZA" smtClean="0"/>
-              <a:t>2021/08/24</a:t>
+              <a:t>2022/03/16</a:t>
             </a:fld>
             <a:endParaRPr lang="en-ZA"/>
           </a:p>
@@ -764,7 +764,7 @@
           <a:p>
             <a:fld id="{4CDFA81C-CAC3-4C3D-B082-B3E3AE4B931F}" type="datetimeFigureOut">
               <a:rPr lang="en-ZA" smtClean="0"/>
-              <a:t>2021/08/24</a:t>
+              <a:t>2022/03/16</a:t>
             </a:fld>
             <a:endParaRPr lang="en-ZA"/>
           </a:p>
@@ -1010,7 +1010,7 @@
           <a:p>
             <a:fld id="{4CDFA81C-CAC3-4C3D-B082-B3E3AE4B931F}" type="datetimeFigureOut">
               <a:rPr lang="en-ZA" smtClean="0"/>
-              <a:t>2021/08/24</a:t>
+              <a:t>2022/03/16</a:t>
             </a:fld>
             <a:endParaRPr lang="en-ZA"/>
           </a:p>
@@ -1242,7 +1242,7 @@
           <a:p>
             <a:fld id="{4CDFA81C-CAC3-4C3D-B082-B3E3AE4B931F}" type="datetimeFigureOut">
               <a:rPr lang="en-ZA" smtClean="0"/>
-              <a:t>2021/08/24</a:t>
+              <a:t>2022/03/16</a:t>
             </a:fld>
             <a:endParaRPr lang="en-ZA"/>
           </a:p>
@@ -1609,7 +1609,7 @@
           <a:p>
             <a:fld id="{4CDFA81C-CAC3-4C3D-B082-B3E3AE4B931F}" type="datetimeFigureOut">
               <a:rPr lang="en-ZA" smtClean="0"/>
-              <a:t>2021/08/24</a:t>
+              <a:t>2022/03/16</a:t>
             </a:fld>
             <a:endParaRPr lang="en-ZA"/>
           </a:p>
@@ -1727,7 +1727,7 @@
           <a:p>
             <a:fld id="{4CDFA81C-CAC3-4C3D-B082-B3E3AE4B931F}" type="datetimeFigureOut">
               <a:rPr lang="en-ZA" smtClean="0"/>
-              <a:t>2021/08/24</a:t>
+              <a:t>2022/03/16</a:t>
             </a:fld>
             <a:endParaRPr lang="en-ZA"/>
           </a:p>
@@ -1822,7 +1822,7 @@
           <a:p>
             <a:fld id="{4CDFA81C-CAC3-4C3D-B082-B3E3AE4B931F}" type="datetimeFigureOut">
               <a:rPr lang="en-ZA" smtClean="0"/>
-              <a:t>2021/08/24</a:t>
+              <a:t>2022/03/16</a:t>
             </a:fld>
             <a:endParaRPr lang="en-ZA"/>
           </a:p>
@@ -2099,7 +2099,7 @@
           <a:p>
             <a:fld id="{4CDFA81C-CAC3-4C3D-B082-B3E3AE4B931F}" type="datetimeFigureOut">
               <a:rPr lang="en-ZA" smtClean="0"/>
-              <a:t>2021/08/24</a:t>
+              <a:t>2022/03/16</a:t>
             </a:fld>
             <a:endParaRPr lang="en-ZA"/>
           </a:p>
@@ -2352,7 +2352,7 @@
           <a:p>
             <a:fld id="{4CDFA81C-CAC3-4C3D-B082-B3E3AE4B931F}" type="datetimeFigureOut">
               <a:rPr lang="en-ZA" smtClean="0"/>
-              <a:t>2021/08/24</a:t>
+              <a:t>2022/03/16</a:t>
             </a:fld>
             <a:endParaRPr lang="en-ZA"/>
           </a:p>
@@ -2565,7 +2565,7 @@
           <a:p>
             <a:fld id="{4CDFA81C-CAC3-4C3D-B082-B3E3AE4B931F}" type="datetimeFigureOut">
               <a:rPr lang="en-ZA" smtClean="0"/>
-              <a:t>2021/08/24</a:t>
+              <a:t>2022/03/16</a:t>
             </a:fld>
             <a:endParaRPr lang="en-ZA"/>
           </a:p>
@@ -3443,8 +3443,8 @@
         </p:nvSpPr>
         <p:spPr>
           <a:xfrm>
-            <a:off x="4499956" y="157942"/>
-            <a:ext cx="4281055" cy="6542116"/>
+            <a:off x="3668683" y="157942"/>
+            <a:ext cx="3705141" cy="6542116"/>
           </a:xfrm>
           <a:prstGeom prst="rect">
             <a:avLst/>
@@ -3489,8 +3489,8 @@
         </p:nvSpPr>
         <p:spPr>
           <a:xfrm>
-            <a:off x="8891847" y="157942"/>
-            <a:ext cx="3200401" cy="6542116"/>
+            <a:off x="7435659" y="157942"/>
+            <a:ext cx="4545751" cy="6542116"/>
           </a:xfrm>
           <a:prstGeom prst="rect">
             <a:avLst/>
@@ -3498,7 +3498,7 @@
           <a:noFill/>
           <a:ln>
             <a:solidFill>
-              <a:srgbClr val="7030A0"/>
+              <a:srgbClr val="F04A2E"/>
             </a:solidFill>
           </a:ln>
         </p:spPr>
@@ -3536,7 +3536,7 @@
         <p:spPr>
           <a:xfrm>
             <a:off x="108065" y="157942"/>
-            <a:ext cx="1184427" cy="369332"/>
+            <a:ext cx="1729384" cy="369332"/>
           </a:xfrm>
           <a:prstGeom prst="rect">
             <a:avLst/>
@@ -3555,7 +3555,7 @@
                   <a:schemeClr val="accent6"/>
                 </a:solidFill>
               </a:rPr>
-              <a:t>Simulation</a:t>
+              <a:t>Data Generation</a:t>
             </a:r>
             <a:endParaRPr lang="en-ZA" dirty="0">
               <a:solidFill>
@@ -3573,8 +3573,8 @@
         </p:nvSpPr>
         <p:spPr>
           <a:xfrm>
-            <a:off x="4499956" y="157942"/>
-            <a:ext cx="1184427" cy="369332"/>
+            <a:off x="3704706" y="157942"/>
+            <a:ext cx="3234732" cy="369332"/>
           </a:xfrm>
           <a:prstGeom prst="rect">
             <a:avLst/>
@@ -3593,7 +3593,7 @@
                   <a:schemeClr val="accent1"/>
                 </a:solidFill>
               </a:rPr>
-              <a:t>Simulation</a:t>
+              <a:t>Offline Modelling and Prediction</a:t>
             </a:r>
             <a:endParaRPr lang="en-ZA" dirty="0">
               <a:solidFill>
@@ -3603,16 +3603,64 @@
           </a:p>
         </p:txBody>
       </p:sp>
-      <p:sp>
-        <p:nvSpPr>
-          <p:cNvPr id="22" name="TextBox 21"/>
+      <p:pic>
+        <p:nvPicPr>
+          <p:cNvPr id="4" name="Picture 3"/>
+          <p:cNvPicPr>
+            <a:picLocks noChangeAspect="1"/>
+          </p:cNvPicPr>
+          <p:nvPr/>
+        </p:nvPicPr>
+        <p:blipFill>
+          <a:blip r:embed="rId2"/>
+          <a:stretch>
+            <a:fillRect/>
+          </a:stretch>
+        </p:blipFill>
+        <p:spPr>
+          <a:xfrm>
+            <a:off x="601882" y="513202"/>
+            <a:ext cx="2474404" cy="1991481"/>
+          </a:xfrm>
+          <a:prstGeom prst="rect">
+            <a:avLst/>
+          </a:prstGeom>
+        </p:spPr>
+      </p:pic>
+      <p:pic>
+        <p:nvPicPr>
+          <p:cNvPr id="5" name="Picture 4"/>
+          <p:cNvPicPr>
+            <a:picLocks noChangeAspect="1"/>
+          </p:cNvPicPr>
+          <p:nvPr/>
+        </p:nvPicPr>
+        <p:blipFill>
+          <a:blip r:embed="rId3"/>
+          <a:stretch>
+            <a:fillRect/>
+          </a:stretch>
+        </p:blipFill>
+        <p:spPr>
+          <a:xfrm>
+            <a:off x="149797" y="2783935"/>
+            <a:ext cx="3332368" cy="1752773"/>
+          </a:xfrm>
+          <a:prstGeom prst="rect">
+            <a:avLst/>
+          </a:prstGeom>
+        </p:spPr>
+      </p:pic>
+      <p:sp>
+        <p:nvSpPr>
+          <p:cNvPr id="10" name="TextBox 9"/>
           <p:cNvSpPr txBox="1"/>
           <p:nvPr/>
         </p:nvSpPr>
         <p:spPr>
           <a:xfrm>
-            <a:off x="8891847" y="157942"/>
-            <a:ext cx="1184427" cy="369332"/>
+            <a:off x="149797" y="2506936"/>
+            <a:ext cx="2237600" cy="307777"/>
           </a:xfrm>
           <a:prstGeom prst="rect">
             <a:avLst/>
@@ -3626,16 +3674,2326 @@
           <a:lstStyle/>
           <a:p>
             <a:r>
+              <a:rPr lang="en-ZA" sz="1400" b="1" dirty="0" smtClean="0"/>
+              <a:t>Fed-batch Penicillin Process</a:t>
+            </a:r>
+            <a:endParaRPr lang="en-ZA" sz="1400" b="1" dirty="0"/>
+          </a:p>
+        </p:txBody>
+      </p:sp>
+      <p:sp>
+        <p:nvSpPr>
+          <p:cNvPr id="8" name="Rectangle 7"/>
+          <p:cNvSpPr/>
+          <p:nvPr/>
+        </p:nvSpPr>
+        <p:spPr>
+          <a:xfrm>
+            <a:off x="211754" y="4606084"/>
+            <a:ext cx="3341253" cy="1184940"/>
+          </a:xfrm>
+          <a:prstGeom prst="rect">
+            <a:avLst/>
+          </a:prstGeom>
+        </p:spPr>
+        <p:txBody>
+          <a:bodyPr wrap="square">
+            <a:spAutoFit/>
+          </a:bodyPr>
+          <a:lstStyle/>
+          <a:p>
+            <a:pPr marL="285750" lvl="0" indent="-285750" algn="just">
+              <a:lnSpc>
+                <a:spcPct val="115000"/>
+              </a:lnSpc>
+              <a:spcBef>
+                <a:spcPts val="600"/>
+              </a:spcBef>
+              <a:spcAft>
+                <a:spcPts val="0"/>
+              </a:spcAft>
+              <a:buFont typeface="Arial" panose="020B0604020202020204" pitchFamily="34" charset="0"/>
+              <a:buChar char="•"/>
+            </a:pPr>
+            <a:r>
+              <a:rPr lang="en-GB" sz="1000" dirty="0">
+                <a:latin typeface="Calibri" panose="020F0502020204030204" pitchFamily="34" charset="0"/>
+                <a:ea typeface="Calibri" panose="020F0502020204030204" pitchFamily="34" charset="0"/>
+                <a:cs typeface="Times New Roman" panose="02020603050405020304" pitchFamily="18" charset="0"/>
+              </a:rPr>
+              <a:t>Inherently multiphase &amp; nonlinear</a:t>
+            </a:r>
+            <a:endParaRPr lang="en-ZA" sz="1000" dirty="0">
+              <a:latin typeface="Calibri" panose="020F0502020204030204" pitchFamily="34" charset="0"/>
+              <a:ea typeface="Calibri" panose="020F0502020204030204" pitchFamily="34" charset="0"/>
+              <a:cs typeface="Times New Roman" panose="02020603050405020304" pitchFamily="18" charset="0"/>
+            </a:endParaRPr>
+          </a:p>
+          <a:p>
+            <a:pPr marL="285750" lvl="0" indent="-285750" algn="just">
+              <a:lnSpc>
+                <a:spcPct val="115000"/>
+              </a:lnSpc>
+              <a:spcAft>
+                <a:spcPts val="0"/>
+              </a:spcAft>
+              <a:buFont typeface="Arial" panose="020B0604020202020204" pitchFamily="34" charset="0"/>
+              <a:buChar char="•"/>
+            </a:pPr>
+            <a:r>
+              <a:rPr lang="en-GB" sz="1000" dirty="0">
+                <a:latin typeface="Calibri" panose="020F0502020204030204" pitchFamily="34" charset="0"/>
+                <a:ea typeface="Calibri" panose="020F0502020204030204" pitchFamily="34" charset="0"/>
+                <a:cs typeface="Times New Roman" panose="02020603050405020304" pitchFamily="18" charset="0"/>
+              </a:rPr>
+              <a:t>Variations in initial </a:t>
+            </a:r>
+            <a:r>
+              <a:rPr lang="en-GB" sz="1000" dirty="0" smtClean="0">
+                <a:latin typeface="Calibri" panose="020F0502020204030204" pitchFamily="34" charset="0"/>
+                <a:ea typeface="Calibri" panose="020F0502020204030204" pitchFamily="34" charset="0"/>
+                <a:cs typeface="Times New Roman" panose="02020603050405020304" pitchFamily="18" charset="0"/>
+              </a:rPr>
+              <a:t>conditions             </a:t>
+            </a:r>
+            <a:endParaRPr lang="en-ZA" sz="1000" dirty="0">
+              <a:latin typeface="Calibri" panose="020F0502020204030204" pitchFamily="34" charset="0"/>
+              <a:ea typeface="Calibri" panose="020F0502020204030204" pitchFamily="34" charset="0"/>
+              <a:cs typeface="Times New Roman" panose="02020603050405020304" pitchFamily="18" charset="0"/>
+            </a:endParaRPr>
+          </a:p>
+          <a:p>
+            <a:pPr marL="285750" lvl="0" indent="-285750" algn="just">
+              <a:lnSpc>
+                <a:spcPct val="115000"/>
+              </a:lnSpc>
+              <a:spcAft>
+                <a:spcPts val="0"/>
+              </a:spcAft>
+              <a:buFont typeface="Arial" panose="020B0604020202020204" pitchFamily="34" charset="0"/>
+              <a:buChar char="•"/>
+            </a:pPr>
+            <a:r>
+              <a:rPr lang="en-GB" sz="1000" dirty="0">
+                <a:latin typeface="Calibri" panose="020F0502020204030204" pitchFamily="34" charset="0"/>
+                <a:ea typeface="Calibri" panose="020F0502020204030204" pitchFamily="34" charset="0"/>
+                <a:cs typeface="Times New Roman" panose="02020603050405020304" pitchFamily="18" charset="0"/>
+              </a:rPr>
+              <a:t>Noise on certain </a:t>
+            </a:r>
+            <a:r>
+              <a:rPr lang="en-GB" sz="1000" dirty="0" smtClean="0">
+                <a:latin typeface="Calibri" panose="020F0502020204030204" pitchFamily="34" charset="0"/>
+                <a:ea typeface="Calibri" panose="020F0502020204030204" pitchFamily="34" charset="0"/>
+                <a:cs typeface="Times New Roman" panose="02020603050405020304" pitchFamily="18" charset="0"/>
+              </a:rPr>
+              <a:t>signals                         (O2, CO2)</a:t>
+            </a:r>
+            <a:endParaRPr lang="en-ZA" sz="1000" dirty="0">
+              <a:latin typeface="Calibri" panose="020F0502020204030204" pitchFamily="34" charset="0"/>
+              <a:ea typeface="Calibri" panose="020F0502020204030204" pitchFamily="34" charset="0"/>
+              <a:cs typeface="Times New Roman" panose="02020603050405020304" pitchFamily="18" charset="0"/>
+            </a:endParaRPr>
+          </a:p>
+          <a:p>
+            <a:pPr marL="285750" lvl="0" indent="-285750" algn="just">
+              <a:lnSpc>
+                <a:spcPct val="115000"/>
+              </a:lnSpc>
+              <a:spcAft>
+                <a:spcPts val="600"/>
+              </a:spcAft>
+              <a:buFont typeface="Arial" panose="020B0604020202020204" pitchFamily="34" charset="0"/>
+              <a:buChar char="•"/>
+            </a:pPr>
+            <a:r>
+              <a:rPr lang="en-GB" sz="1000" dirty="0">
+                <a:latin typeface="Calibri" panose="020F0502020204030204" pitchFamily="34" charset="0"/>
+                <a:ea typeface="Calibri" panose="020F0502020204030204" pitchFamily="34" charset="0"/>
+                <a:cs typeface="Times New Roman" panose="02020603050405020304" pitchFamily="18" charset="0"/>
+              </a:rPr>
+              <a:t>Time delays in quality measurements (Z.O.H)</a:t>
+            </a:r>
+            <a:endParaRPr lang="en-ZA" sz="1000" dirty="0">
+              <a:latin typeface="Calibri" panose="020F0502020204030204" pitchFamily="34" charset="0"/>
+              <a:ea typeface="Calibri" panose="020F0502020204030204" pitchFamily="34" charset="0"/>
+              <a:cs typeface="Times New Roman" panose="02020603050405020304" pitchFamily="18" charset="0"/>
+            </a:endParaRPr>
+          </a:p>
+          <a:p>
+            <a:pPr marL="285750" indent="-285750">
+              <a:buFont typeface="Arial" panose="020B0604020202020204" pitchFamily="34" charset="0"/>
+              <a:buChar char="•"/>
+            </a:pPr>
+            <a:r>
+              <a:rPr lang="en-GB" sz="1000" dirty="0">
+                <a:latin typeface="Calibri" panose="020F0502020204030204" pitchFamily="34" charset="0"/>
+                <a:ea typeface="Times New Roman" panose="02020603050405020304" pitchFamily="18" charset="0"/>
+                <a:cs typeface="Times New Roman" panose="02020603050405020304" pitchFamily="18" charset="0"/>
+              </a:rPr>
+              <a:t>Variation in timing of key </a:t>
+            </a:r>
+            <a:r>
+              <a:rPr lang="en-GB" sz="1000" dirty="0" smtClean="0">
+                <a:latin typeface="Calibri" panose="020F0502020204030204" pitchFamily="34" charset="0"/>
+                <a:ea typeface="Times New Roman" panose="02020603050405020304" pitchFamily="18" charset="0"/>
+                <a:cs typeface="Times New Roman" panose="02020603050405020304" pitchFamily="18" charset="0"/>
+              </a:rPr>
+              <a:t>sequences (S = 0.3g/ mol)</a:t>
+            </a:r>
+          </a:p>
+          <a:p>
+            <a:pPr marL="285750" indent="-285750">
+              <a:buFont typeface="Arial" panose="020B0604020202020204" pitchFamily="34" charset="0"/>
+              <a:buChar char="•"/>
+            </a:pPr>
+            <a:r>
+              <a:rPr lang="en-GB" sz="1000" dirty="0" smtClean="0">
+                <a:latin typeface="Calibri" panose="020F0502020204030204" pitchFamily="34" charset="0"/>
+                <a:cs typeface="Times New Roman" panose="02020603050405020304" pitchFamily="18" charset="0"/>
+              </a:rPr>
+              <a:t>Variations in batch lengths                  (P &gt;= 1.3 g/ mol)</a:t>
+            </a:r>
+            <a:endParaRPr lang="en-ZA" sz="1000" dirty="0"/>
+          </a:p>
+        </p:txBody>
+      </p:sp>
+      <p:sp>
+        <p:nvSpPr>
+          <p:cNvPr id="17" name="TextBox 16"/>
+          <p:cNvSpPr txBox="1"/>
+          <p:nvPr/>
+        </p:nvSpPr>
+        <p:spPr>
+          <a:xfrm>
+            <a:off x="3704706" y="622018"/>
+            <a:ext cx="1276953" cy="307777"/>
+          </a:xfrm>
+          <a:prstGeom prst="rect">
+            <a:avLst/>
+          </a:prstGeom>
+          <a:noFill/>
+        </p:spPr>
+        <p:txBody>
+          <a:bodyPr wrap="none" rtlCol="0">
+            <a:spAutoFit/>
+          </a:bodyPr>
+          <a:lstStyle/>
+          <a:p>
+            <a:r>
+              <a:rPr lang="en-ZA" sz="1400" b="1" dirty="0" smtClean="0">
+                <a:solidFill>
+                  <a:schemeClr val="accent1"/>
+                </a:solidFill>
+              </a:rPr>
+              <a:t>Pre-Processing</a:t>
+            </a:r>
+            <a:endParaRPr lang="en-ZA" sz="1400" b="1" dirty="0">
+              <a:solidFill>
+                <a:schemeClr val="accent1"/>
+              </a:solidFill>
+            </a:endParaRPr>
+          </a:p>
+        </p:txBody>
+      </p:sp>
+      <p:sp>
+        <p:nvSpPr>
+          <p:cNvPr id="9" name="Rounded Rectangle 8"/>
+          <p:cNvSpPr/>
+          <p:nvPr/>
+        </p:nvSpPr>
+        <p:spPr>
+          <a:xfrm>
+            <a:off x="4068290" y="996942"/>
+            <a:ext cx="3040125" cy="535781"/>
+          </a:xfrm>
+          <a:prstGeom prst="roundRect">
+            <a:avLst/>
+          </a:prstGeom>
+          <a:noFill/>
+          <a:ln>
+            <a:solidFill>
+              <a:schemeClr val="bg2">
+                <a:lumMod val="75000"/>
+              </a:schemeClr>
+            </a:solidFill>
+          </a:ln>
+        </p:spPr>
+        <p:style>
+          <a:lnRef idx="2">
+            <a:schemeClr val="accent1">
+              <a:shade val="50000"/>
+            </a:schemeClr>
+          </a:lnRef>
+          <a:fillRef idx="1">
+            <a:schemeClr val="accent1"/>
+          </a:fillRef>
+          <a:effectRef idx="0">
+            <a:schemeClr val="accent1"/>
+          </a:effectRef>
+          <a:fontRef idx="minor">
+            <a:schemeClr val="lt1"/>
+          </a:fontRef>
+        </p:style>
+        <p:txBody>
+          <a:bodyPr rtlCol="0" anchor="ctr"/>
+          <a:lstStyle/>
+          <a:p>
+            <a:pPr algn="ctr"/>
+            <a:r>
+              <a:rPr lang="en-ZA" sz="1100" dirty="0" smtClean="0">
+                <a:solidFill>
+                  <a:schemeClr val="tx1"/>
+                </a:solidFill>
+              </a:rPr>
+              <a:t>Dynamic Time Warping </a:t>
+            </a:r>
+            <a:r>
+              <a:rPr lang="en-ZA" sz="1100" b="1" dirty="0" smtClean="0">
+                <a:solidFill>
+                  <a:schemeClr val="tx1"/>
+                </a:solidFill>
+              </a:rPr>
+              <a:t>(DTW) </a:t>
+            </a:r>
+            <a:r>
+              <a:rPr lang="en-ZA" sz="1100" dirty="0" smtClean="0">
+                <a:solidFill>
+                  <a:schemeClr val="tx1"/>
+                </a:solidFill>
+              </a:rPr>
+              <a:t>/ Indicator Variable </a:t>
+            </a:r>
+            <a:r>
+              <a:rPr lang="en-ZA" sz="1100" b="1" dirty="0" smtClean="0">
+                <a:solidFill>
+                  <a:schemeClr val="tx1"/>
+                </a:solidFill>
+              </a:rPr>
+              <a:t>(IV) </a:t>
+            </a:r>
+            <a:r>
+              <a:rPr lang="en-ZA" sz="1100" dirty="0">
+                <a:solidFill>
+                  <a:schemeClr val="tx1"/>
+                </a:solidFill>
+              </a:rPr>
+              <a:t>trajectory alignment </a:t>
+            </a:r>
+          </a:p>
+        </p:txBody>
+      </p:sp>
+      <p:sp>
+        <p:nvSpPr>
+          <p:cNvPr id="18" name="Rounded Rectangle 17"/>
+          <p:cNvSpPr/>
+          <p:nvPr/>
+        </p:nvSpPr>
+        <p:spPr>
+          <a:xfrm>
+            <a:off x="3860385" y="1722234"/>
+            <a:ext cx="2485505" cy="541324"/>
+          </a:xfrm>
+          <a:prstGeom prst="roundRect">
+            <a:avLst/>
+          </a:prstGeom>
+          <a:noFill/>
+          <a:ln>
+            <a:solidFill>
+              <a:schemeClr val="bg2">
+                <a:lumMod val="75000"/>
+              </a:schemeClr>
+            </a:solidFill>
+          </a:ln>
+        </p:spPr>
+        <p:style>
+          <a:lnRef idx="2">
+            <a:schemeClr val="accent1">
+              <a:shade val="50000"/>
+            </a:schemeClr>
+          </a:lnRef>
+          <a:fillRef idx="1">
+            <a:schemeClr val="accent1"/>
+          </a:fillRef>
+          <a:effectRef idx="0">
+            <a:schemeClr val="accent1"/>
+          </a:effectRef>
+          <a:fontRef idx="minor">
+            <a:schemeClr val="lt1"/>
+          </a:fontRef>
+        </p:style>
+        <p:txBody>
+          <a:bodyPr rtlCol="0" anchor="ctr"/>
+          <a:lstStyle/>
+          <a:p>
+            <a:pPr algn="ctr"/>
+            <a:r>
+              <a:rPr lang="en-ZA" sz="1100" dirty="0" smtClean="0">
+                <a:solidFill>
+                  <a:schemeClr val="tx1"/>
+                </a:solidFill>
+              </a:rPr>
+              <a:t>3D batch data </a:t>
+            </a:r>
+            <a:r>
+              <a:rPr lang="en-ZA" sz="1100" b="1" dirty="0" smtClean="0">
+                <a:solidFill>
+                  <a:schemeClr val="tx1"/>
+                </a:solidFill>
+              </a:rPr>
+              <a:t>Unfolding</a:t>
+            </a:r>
+            <a:r>
+              <a:rPr lang="en-ZA" sz="1100" dirty="0" smtClean="0">
+                <a:solidFill>
+                  <a:schemeClr val="tx1"/>
+                </a:solidFill>
+              </a:rPr>
+              <a:t> (variable-wise) to 2D and normalization </a:t>
+            </a:r>
+            <a:endParaRPr lang="en-ZA" sz="1100" dirty="0">
+              <a:solidFill>
+                <a:schemeClr val="tx1"/>
+              </a:solidFill>
+            </a:endParaRPr>
+          </a:p>
+        </p:txBody>
+      </p:sp>
+      <p:sp>
+        <p:nvSpPr>
+          <p:cNvPr id="19" name="Rounded Rectangle 18"/>
+          <p:cNvSpPr/>
+          <p:nvPr/>
+        </p:nvSpPr>
+        <p:spPr>
+          <a:xfrm>
+            <a:off x="3698027" y="2457750"/>
+            <a:ext cx="2824263" cy="569010"/>
+          </a:xfrm>
+          <a:prstGeom prst="roundRect">
+            <a:avLst/>
+          </a:prstGeom>
+          <a:noFill/>
+          <a:ln>
+            <a:solidFill>
+              <a:schemeClr val="bg2">
+                <a:lumMod val="75000"/>
+              </a:schemeClr>
+            </a:solidFill>
+          </a:ln>
+        </p:spPr>
+        <p:style>
+          <a:lnRef idx="2">
+            <a:schemeClr val="accent1">
+              <a:shade val="50000"/>
+            </a:schemeClr>
+          </a:lnRef>
+          <a:fillRef idx="1">
+            <a:schemeClr val="accent1"/>
+          </a:fillRef>
+          <a:effectRef idx="0">
+            <a:schemeClr val="accent1"/>
+          </a:effectRef>
+          <a:fontRef idx="minor">
+            <a:schemeClr val="lt1"/>
+          </a:fontRef>
+        </p:style>
+        <p:txBody>
+          <a:bodyPr rtlCol="0" anchor="ctr"/>
+          <a:lstStyle/>
+          <a:p>
+            <a:pPr algn="ctr"/>
+            <a:r>
+              <a:rPr lang="en-ZA" sz="1100" dirty="0" smtClean="0">
+                <a:solidFill>
+                  <a:schemeClr val="tx1"/>
+                </a:solidFill>
+              </a:rPr>
+              <a:t>Remove collinearity and reduce dimension of input variables using </a:t>
+            </a:r>
+            <a:r>
+              <a:rPr lang="en-ZA" sz="1100" b="1" dirty="0" smtClean="0">
+                <a:solidFill>
+                  <a:schemeClr val="tx1"/>
+                </a:solidFill>
+              </a:rPr>
+              <a:t>PCA</a:t>
+            </a:r>
+            <a:endParaRPr lang="en-ZA" sz="1100" b="1" dirty="0">
+              <a:solidFill>
+                <a:schemeClr val="tx1"/>
+              </a:solidFill>
+            </a:endParaRPr>
+          </a:p>
+        </p:txBody>
+      </p:sp>
+      <p:sp>
+        <p:nvSpPr>
+          <p:cNvPr id="20" name="TextBox 19"/>
+          <p:cNvSpPr txBox="1"/>
+          <p:nvPr/>
+        </p:nvSpPr>
+        <p:spPr>
+          <a:xfrm>
+            <a:off x="3815542" y="3121223"/>
+            <a:ext cx="1394741" cy="307777"/>
+          </a:xfrm>
+          <a:prstGeom prst="rect">
+            <a:avLst/>
+          </a:prstGeom>
+          <a:noFill/>
+        </p:spPr>
+        <p:txBody>
+          <a:bodyPr wrap="none" rtlCol="0">
+            <a:spAutoFit/>
+          </a:bodyPr>
+          <a:lstStyle/>
+          <a:p>
+            <a:r>
+              <a:rPr lang="en-ZA" sz="1400" b="1" dirty="0" smtClean="0">
+                <a:solidFill>
+                  <a:schemeClr val="accent1"/>
+                </a:solidFill>
+              </a:rPr>
+              <a:t>Phase Detection</a:t>
+            </a:r>
+            <a:endParaRPr lang="en-ZA" sz="1400" b="1" dirty="0">
+              <a:solidFill>
+                <a:schemeClr val="accent1"/>
+              </a:solidFill>
+            </a:endParaRPr>
+          </a:p>
+        </p:txBody>
+      </p:sp>
+      <p:sp>
+        <p:nvSpPr>
+          <p:cNvPr id="23" name="Rounded Rectangle 22"/>
+          <p:cNvSpPr/>
+          <p:nvPr/>
+        </p:nvSpPr>
+        <p:spPr>
+          <a:xfrm>
+            <a:off x="3804702" y="3429000"/>
+            <a:ext cx="2824263" cy="569010"/>
+          </a:xfrm>
+          <a:prstGeom prst="roundRect">
+            <a:avLst/>
+          </a:prstGeom>
+          <a:noFill/>
+          <a:ln>
+            <a:solidFill>
+              <a:schemeClr val="bg2">
+                <a:lumMod val="75000"/>
+              </a:schemeClr>
+            </a:solidFill>
+          </a:ln>
+        </p:spPr>
+        <p:style>
+          <a:lnRef idx="2">
+            <a:schemeClr val="accent1">
+              <a:shade val="50000"/>
+            </a:schemeClr>
+          </a:lnRef>
+          <a:fillRef idx="1">
+            <a:schemeClr val="accent1"/>
+          </a:fillRef>
+          <a:effectRef idx="0">
+            <a:schemeClr val="accent1"/>
+          </a:effectRef>
+          <a:fontRef idx="minor">
+            <a:schemeClr val="lt1"/>
+          </a:fontRef>
+        </p:style>
+        <p:txBody>
+          <a:bodyPr rtlCol="0" anchor="ctr"/>
+          <a:lstStyle/>
+          <a:p>
+            <a:pPr algn="ctr"/>
+            <a:r>
+              <a:rPr lang="en-ZA" sz="1100" b="1" dirty="0" smtClean="0">
+                <a:solidFill>
+                  <a:schemeClr val="tx1"/>
+                </a:solidFill>
+              </a:rPr>
+              <a:t>K-means</a:t>
+            </a:r>
+            <a:r>
+              <a:rPr lang="en-ZA" sz="1100" dirty="0" smtClean="0">
+                <a:solidFill>
+                  <a:schemeClr val="tx1"/>
+                </a:solidFill>
+              </a:rPr>
+              <a:t> and </a:t>
+            </a:r>
+            <a:r>
+              <a:rPr lang="en-ZA" sz="1100" b="1" dirty="0" smtClean="0">
+                <a:solidFill>
+                  <a:schemeClr val="tx1"/>
+                </a:solidFill>
+              </a:rPr>
+              <a:t>DBScan</a:t>
+            </a:r>
+            <a:r>
+              <a:rPr lang="en-ZA" sz="1100" dirty="0" smtClean="0">
+                <a:solidFill>
+                  <a:schemeClr val="tx1"/>
+                </a:solidFill>
+              </a:rPr>
+              <a:t> on latent variables to determine initial guess for GMM clusters </a:t>
+            </a:r>
+            <a:endParaRPr lang="en-ZA" sz="1100" dirty="0">
+              <a:solidFill>
+                <a:schemeClr val="tx1"/>
+              </a:solidFill>
+            </a:endParaRPr>
+          </a:p>
+        </p:txBody>
+      </p:sp>
+      <p:sp>
+        <p:nvSpPr>
+          <p:cNvPr id="24" name="Rounded Rectangle 23"/>
+          <p:cNvSpPr/>
+          <p:nvPr/>
+        </p:nvSpPr>
+        <p:spPr>
+          <a:xfrm>
+            <a:off x="4002817" y="4251386"/>
+            <a:ext cx="2429843" cy="569010"/>
+          </a:xfrm>
+          <a:prstGeom prst="roundRect">
+            <a:avLst/>
+          </a:prstGeom>
+          <a:noFill/>
+          <a:ln>
+            <a:solidFill>
+              <a:schemeClr val="bg2">
+                <a:lumMod val="75000"/>
+              </a:schemeClr>
+            </a:solidFill>
+          </a:ln>
+        </p:spPr>
+        <p:style>
+          <a:lnRef idx="2">
+            <a:schemeClr val="accent1">
+              <a:shade val="50000"/>
+            </a:schemeClr>
+          </a:lnRef>
+          <a:fillRef idx="1">
+            <a:schemeClr val="accent1"/>
+          </a:fillRef>
+          <a:effectRef idx="0">
+            <a:schemeClr val="accent1"/>
+          </a:effectRef>
+          <a:fontRef idx="minor">
+            <a:schemeClr val="lt1"/>
+          </a:fontRef>
+        </p:style>
+        <p:txBody>
+          <a:bodyPr rtlCol="0" anchor="ctr"/>
+          <a:lstStyle/>
+          <a:p>
+            <a:pPr algn="ctr"/>
+            <a:r>
+              <a:rPr lang="en-ZA" sz="1100" dirty="0" smtClean="0">
+                <a:solidFill>
+                  <a:schemeClr val="tx1"/>
+                </a:solidFill>
+              </a:rPr>
+              <a:t>Identify</a:t>
+            </a:r>
+            <a:r>
+              <a:rPr lang="en-ZA" sz="1100" b="1" dirty="0" smtClean="0">
+                <a:solidFill>
+                  <a:schemeClr val="tx1"/>
+                </a:solidFill>
+              </a:rPr>
+              <a:t> operating phases intervals</a:t>
+            </a:r>
+          </a:p>
+          <a:p>
+            <a:pPr algn="ctr"/>
+            <a:r>
+              <a:rPr lang="en-ZA" sz="1100" dirty="0" smtClean="0">
+                <a:solidFill>
+                  <a:schemeClr val="tx1"/>
+                </a:solidFill>
+              </a:rPr>
+              <a:t>Estimate </a:t>
+            </a:r>
+            <a:r>
+              <a:rPr lang="en-ZA" sz="1100" b="1" dirty="0" smtClean="0">
+                <a:solidFill>
+                  <a:schemeClr val="tx1"/>
+                </a:solidFill>
+              </a:rPr>
+              <a:t>GMM</a:t>
+            </a:r>
+            <a:r>
+              <a:rPr lang="en-ZA" sz="1100" dirty="0" smtClean="0">
+                <a:solidFill>
+                  <a:schemeClr val="tx1"/>
+                </a:solidFill>
+              </a:rPr>
+              <a:t>, incorporating </a:t>
+            </a:r>
+            <a:r>
+              <a:rPr lang="en-ZA" sz="1100" b="1" dirty="0" smtClean="0">
+                <a:solidFill>
+                  <a:schemeClr val="tx1"/>
+                </a:solidFill>
+              </a:rPr>
+              <a:t>AIC/BIC</a:t>
+            </a:r>
+            <a:r>
+              <a:rPr lang="en-ZA" sz="1100" dirty="0" smtClean="0">
+                <a:solidFill>
+                  <a:schemeClr val="tx1"/>
+                </a:solidFill>
+              </a:rPr>
+              <a:t> </a:t>
+            </a:r>
+            <a:endParaRPr lang="en-ZA" sz="1100" dirty="0">
+              <a:solidFill>
+                <a:schemeClr val="tx1"/>
+              </a:solidFill>
+            </a:endParaRPr>
+          </a:p>
+        </p:txBody>
+      </p:sp>
+      <p:sp>
+        <p:nvSpPr>
+          <p:cNvPr id="25" name="Rounded Rectangle 24"/>
+          <p:cNvSpPr/>
+          <p:nvPr/>
+        </p:nvSpPr>
+        <p:spPr>
+          <a:xfrm>
+            <a:off x="161475" y="5935175"/>
+            <a:ext cx="3040125" cy="535781"/>
+          </a:xfrm>
+          <a:prstGeom prst="roundRect">
+            <a:avLst/>
+          </a:prstGeom>
+          <a:noFill/>
+          <a:ln>
+            <a:solidFill>
+              <a:schemeClr val="bg2">
+                <a:lumMod val="75000"/>
+              </a:schemeClr>
+            </a:solidFill>
+          </a:ln>
+        </p:spPr>
+        <p:style>
+          <a:lnRef idx="2">
+            <a:schemeClr val="accent1">
+              <a:shade val="50000"/>
+            </a:schemeClr>
+          </a:lnRef>
+          <a:fillRef idx="1">
+            <a:schemeClr val="accent1"/>
+          </a:fillRef>
+          <a:effectRef idx="0">
+            <a:schemeClr val="accent1"/>
+          </a:effectRef>
+          <a:fontRef idx="minor">
+            <a:schemeClr val="lt1"/>
+          </a:fontRef>
+        </p:style>
+        <p:txBody>
+          <a:bodyPr rtlCol="0" anchor="ctr"/>
+          <a:lstStyle/>
+          <a:p>
+            <a:pPr algn="ctr"/>
+            <a:r>
+              <a:rPr lang="en-ZA" sz="1100" b="1" dirty="0" smtClean="0">
+                <a:solidFill>
+                  <a:schemeClr val="tx1"/>
+                </a:solidFill>
+              </a:rPr>
+              <a:t>Collect training data</a:t>
+            </a:r>
+          </a:p>
+          <a:p>
+            <a:pPr algn="ctr"/>
+            <a:r>
+              <a:rPr lang="en-ZA" sz="1100" dirty="0" smtClean="0">
+                <a:solidFill>
+                  <a:schemeClr val="tx1"/>
+                </a:solidFill>
+              </a:rPr>
+              <a:t>50 normal batches, 3-5 non-optimal batches, 1 ‘golden’ reference batch</a:t>
+            </a:r>
+          </a:p>
+        </p:txBody>
+      </p:sp>
+      <p:sp>
+        <p:nvSpPr>
+          <p:cNvPr id="26" name="TextBox 25"/>
+          <p:cNvSpPr txBox="1"/>
+          <p:nvPr/>
+        </p:nvSpPr>
+        <p:spPr>
+          <a:xfrm>
+            <a:off x="3811882" y="5670648"/>
+            <a:ext cx="2133469" cy="307777"/>
+          </a:xfrm>
+          <a:prstGeom prst="rect">
+            <a:avLst/>
+          </a:prstGeom>
+          <a:noFill/>
+        </p:spPr>
+        <p:txBody>
+          <a:bodyPr wrap="none" rtlCol="0">
+            <a:spAutoFit/>
+          </a:bodyPr>
+          <a:lstStyle/>
+          <a:p>
+            <a:r>
+              <a:rPr lang="en-ZA" sz="1400" b="1" dirty="0" smtClean="0">
+                <a:solidFill>
+                  <a:schemeClr val="accent1"/>
+                </a:solidFill>
+              </a:rPr>
+              <a:t>Local Model Development</a:t>
+            </a:r>
+            <a:endParaRPr lang="en-ZA" sz="1400" b="1" dirty="0">
+              <a:solidFill>
+                <a:schemeClr val="accent1"/>
+              </a:solidFill>
+            </a:endParaRPr>
+          </a:p>
+        </p:txBody>
+      </p:sp>
+      <p:sp>
+        <p:nvSpPr>
+          <p:cNvPr id="27" name="Rounded Rectangle 26"/>
+          <p:cNvSpPr/>
+          <p:nvPr/>
+        </p:nvSpPr>
+        <p:spPr>
+          <a:xfrm>
+            <a:off x="4001911" y="5030581"/>
+            <a:ext cx="2429843" cy="569010"/>
+          </a:xfrm>
+          <a:prstGeom prst="roundRect">
+            <a:avLst/>
+          </a:prstGeom>
+          <a:noFill/>
+          <a:ln>
+            <a:solidFill>
+              <a:schemeClr val="bg2">
+                <a:lumMod val="75000"/>
+              </a:schemeClr>
+            </a:solidFill>
+          </a:ln>
+        </p:spPr>
+        <p:style>
+          <a:lnRef idx="2">
+            <a:schemeClr val="accent1">
+              <a:shade val="50000"/>
+            </a:schemeClr>
+          </a:lnRef>
+          <a:fillRef idx="1">
+            <a:schemeClr val="accent1"/>
+          </a:fillRef>
+          <a:effectRef idx="0">
+            <a:schemeClr val="accent1"/>
+          </a:effectRef>
+          <a:fontRef idx="minor">
+            <a:schemeClr val="lt1"/>
+          </a:fontRef>
+        </p:style>
+        <p:txBody>
+          <a:bodyPr rtlCol="0" anchor="ctr"/>
+          <a:lstStyle/>
+          <a:p>
+            <a:pPr algn="ctr"/>
+            <a:r>
+              <a:rPr lang="en-ZA" sz="1100" b="1" dirty="0" smtClean="0">
+                <a:solidFill>
+                  <a:schemeClr val="tx1"/>
+                </a:solidFill>
+              </a:rPr>
+              <a:t>Identify </a:t>
+            </a:r>
+            <a:r>
+              <a:rPr lang="en-ZA" sz="1100" dirty="0" smtClean="0">
+                <a:solidFill>
+                  <a:schemeClr val="tx1"/>
+                </a:solidFill>
+              </a:rPr>
+              <a:t>transition phases as overlap between Gaussians</a:t>
+            </a:r>
+            <a:endParaRPr lang="en-ZA" sz="1100" dirty="0">
+              <a:solidFill>
+                <a:schemeClr val="tx1"/>
+              </a:solidFill>
+            </a:endParaRPr>
+          </a:p>
+        </p:txBody>
+      </p:sp>
+      <p:sp>
+        <p:nvSpPr>
+          <p:cNvPr id="28" name="Rounded Rectangle 27"/>
+          <p:cNvSpPr/>
+          <p:nvPr/>
+        </p:nvSpPr>
+        <p:spPr>
+          <a:xfrm>
+            <a:off x="3811882" y="6025593"/>
+            <a:ext cx="2429843" cy="569010"/>
+          </a:xfrm>
+          <a:prstGeom prst="roundRect">
+            <a:avLst/>
+          </a:prstGeom>
+          <a:noFill/>
+          <a:ln>
+            <a:solidFill>
+              <a:schemeClr val="bg2">
+                <a:lumMod val="75000"/>
+              </a:schemeClr>
+            </a:solidFill>
+          </a:ln>
+        </p:spPr>
+        <p:style>
+          <a:lnRef idx="2">
+            <a:schemeClr val="accent1">
+              <a:shade val="50000"/>
+            </a:schemeClr>
+          </a:lnRef>
+          <a:fillRef idx="1">
+            <a:schemeClr val="accent1"/>
+          </a:fillRef>
+          <a:effectRef idx="0">
+            <a:schemeClr val="accent1"/>
+          </a:effectRef>
+          <a:fontRef idx="minor">
+            <a:schemeClr val="lt1"/>
+          </a:fontRef>
+        </p:style>
+        <p:txBody>
+          <a:bodyPr rtlCol="0" anchor="ctr"/>
+          <a:lstStyle/>
+          <a:p>
+            <a:pPr algn="ctr"/>
+            <a:r>
+              <a:rPr lang="en-ZA" sz="1100" dirty="0" smtClean="0">
+                <a:solidFill>
+                  <a:schemeClr val="tx1"/>
+                </a:solidFill>
+              </a:rPr>
+              <a:t>Develop </a:t>
+            </a:r>
+            <a:r>
+              <a:rPr lang="en-ZA" sz="1100" b="1" dirty="0" smtClean="0">
+                <a:solidFill>
+                  <a:schemeClr val="tx1"/>
+                </a:solidFill>
+              </a:rPr>
+              <a:t>local GPR models </a:t>
+            </a:r>
+            <a:r>
+              <a:rPr lang="en-ZA" sz="1100" dirty="0" smtClean="0">
+                <a:solidFill>
+                  <a:schemeClr val="tx1"/>
+                </a:solidFill>
+              </a:rPr>
+              <a:t>to predict final quality variable</a:t>
+            </a:r>
+            <a:endParaRPr lang="en-ZA" sz="1100" dirty="0">
+              <a:solidFill>
+                <a:schemeClr val="tx1"/>
+              </a:solidFill>
+            </a:endParaRPr>
+          </a:p>
+        </p:txBody>
+      </p:sp>
+      <p:cxnSp>
+        <p:nvCxnSpPr>
+          <p:cNvPr id="13" name="Curved Connector 12"/>
+          <p:cNvCxnSpPr>
+            <a:stCxn id="25" idx="3"/>
+            <a:endCxn id="9" idx="1"/>
+          </p:cNvCxnSpPr>
+          <p:nvPr/>
+        </p:nvCxnSpPr>
+        <p:spPr>
+          <a:xfrm flipV="1">
+            <a:off x="3201600" y="1264833"/>
+            <a:ext cx="866690" cy="4938233"/>
+          </a:xfrm>
+          <a:prstGeom prst="curvedConnector3">
+            <a:avLst>
+              <a:gd name="adj1" fmla="val 23144"/>
+            </a:avLst>
+          </a:prstGeom>
+          <a:ln w="28575">
+            <a:solidFill>
+              <a:schemeClr val="tx1"/>
+            </a:solidFill>
+            <a:tailEnd type="triangle"/>
+          </a:ln>
+        </p:spPr>
+        <p:style>
+          <a:lnRef idx="1">
+            <a:schemeClr val="accent1"/>
+          </a:lnRef>
+          <a:fillRef idx="0">
+            <a:schemeClr val="accent1"/>
+          </a:fillRef>
+          <a:effectRef idx="0">
+            <a:schemeClr val="accent1"/>
+          </a:effectRef>
+          <a:fontRef idx="minor">
+            <a:schemeClr val="tx1"/>
+          </a:fontRef>
+        </p:style>
+      </p:cxnSp>
+      <p:cxnSp>
+        <p:nvCxnSpPr>
+          <p:cNvPr id="33" name="Curved Connector 32"/>
+          <p:cNvCxnSpPr>
+            <a:stCxn id="9" idx="3"/>
+            <a:endCxn id="18" idx="3"/>
+          </p:cNvCxnSpPr>
+          <p:nvPr/>
+        </p:nvCxnSpPr>
+        <p:spPr>
+          <a:xfrm flipH="1">
+            <a:off x="6345890" y="1264833"/>
+            <a:ext cx="762525" cy="728063"/>
+          </a:xfrm>
+          <a:prstGeom prst="curvedConnector3">
+            <a:avLst>
+              <a:gd name="adj1" fmla="val -12537"/>
+            </a:avLst>
+          </a:prstGeom>
+          <a:ln w="28575">
+            <a:solidFill>
+              <a:schemeClr val="tx1"/>
+            </a:solidFill>
+            <a:tailEnd type="triangle"/>
+          </a:ln>
+        </p:spPr>
+        <p:style>
+          <a:lnRef idx="1">
+            <a:schemeClr val="accent1"/>
+          </a:lnRef>
+          <a:fillRef idx="0">
+            <a:schemeClr val="accent1"/>
+          </a:fillRef>
+          <a:effectRef idx="0">
+            <a:schemeClr val="accent1"/>
+          </a:effectRef>
+          <a:fontRef idx="minor">
+            <a:schemeClr val="tx1"/>
+          </a:fontRef>
+        </p:style>
+      </p:cxnSp>
+      <p:cxnSp>
+        <p:nvCxnSpPr>
+          <p:cNvPr id="37" name="Curved Connector 36"/>
+          <p:cNvCxnSpPr>
+            <a:stCxn id="18" idx="2"/>
+            <a:endCxn id="19" idx="0"/>
+          </p:cNvCxnSpPr>
+          <p:nvPr/>
+        </p:nvCxnSpPr>
+        <p:spPr>
+          <a:xfrm rot="16200000" flipH="1">
+            <a:off x="5009552" y="2357143"/>
+            <a:ext cx="194192" cy="7021"/>
+          </a:xfrm>
+          <a:prstGeom prst="curvedConnector3">
+            <a:avLst>
+              <a:gd name="adj1" fmla="val 50000"/>
+            </a:avLst>
+          </a:prstGeom>
+          <a:ln w="28575">
+            <a:solidFill>
+              <a:schemeClr val="tx1"/>
+            </a:solidFill>
+            <a:tailEnd type="triangle"/>
+          </a:ln>
+        </p:spPr>
+        <p:style>
+          <a:lnRef idx="1">
+            <a:schemeClr val="accent1"/>
+          </a:lnRef>
+          <a:fillRef idx="0">
+            <a:schemeClr val="accent1"/>
+          </a:fillRef>
+          <a:effectRef idx="0">
+            <a:schemeClr val="accent1"/>
+          </a:effectRef>
+          <a:fontRef idx="minor">
+            <a:schemeClr val="tx1"/>
+          </a:fontRef>
+        </p:style>
+      </p:cxnSp>
+      <p:cxnSp>
+        <p:nvCxnSpPr>
+          <p:cNvPr id="43" name="Curved Connector 42"/>
+          <p:cNvCxnSpPr>
+            <a:stCxn id="19" idx="3"/>
+            <a:endCxn id="23" idx="3"/>
+          </p:cNvCxnSpPr>
+          <p:nvPr/>
+        </p:nvCxnSpPr>
+        <p:spPr>
+          <a:xfrm>
+            <a:off x="6522290" y="2742255"/>
+            <a:ext cx="106675" cy="971250"/>
+          </a:xfrm>
+          <a:prstGeom prst="curvedConnector3">
+            <a:avLst>
+              <a:gd name="adj1" fmla="val 314296"/>
+            </a:avLst>
+          </a:prstGeom>
+          <a:ln w="28575">
+            <a:solidFill>
+              <a:schemeClr val="tx1"/>
+            </a:solidFill>
+            <a:tailEnd type="triangle"/>
+          </a:ln>
+        </p:spPr>
+        <p:style>
+          <a:lnRef idx="1">
+            <a:schemeClr val="accent1"/>
+          </a:lnRef>
+          <a:fillRef idx="0">
+            <a:schemeClr val="accent1"/>
+          </a:fillRef>
+          <a:effectRef idx="0">
+            <a:schemeClr val="accent1"/>
+          </a:effectRef>
+          <a:fontRef idx="minor">
+            <a:schemeClr val="tx1"/>
+          </a:fontRef>
+        </p:style>
+      </p:cxnSp>
+      <p:cxnSp>
+        <p:nvCxnSpPr>
+          <p:cNvPr id="46" name="Curved Connector 45"/>
+          <p:cNvCxnSpPr>
+            <a:stCxn id="23" idx="2"/>
+            <a:endCxn id="24" idx="0"/>
+          </p:cNvCxnSpPr>
+          <p:nvPr/>
+        </p:nvCxnSpPr>
+        <p:spPr>
+          <a:xfrm rot="16200000" flipH="1">
+            <a:off x="5090598" y="4124245"/>
+            <a:ext cx="253376" cy="905"/>
+          </a:xfrm>
+          <a:prstGeom prst="curvedConnector3">
+            <a:avLst>
+              <a:gd name="adj1" fmla="val 50000"/>
+            </a:avLst>
+          </a:prstGeom>
+          <a:ln w="28575">
+            <a:solidFill>
+              <a:schemeClr val="tx1"/>
+            </a:solidFill>
+            <a:tailEnd type="triangle"/>
+          </a:ln>
+        </p:spPr>
+        <p:style>
+          <a:lnRef idx="1">
+            <a:schemeClr val="accent1"/>
+          </a:lnRef>
+          <a:fillRef idx="0">
+            <a:schemeClr val="accent1"/>
+          </a:fillRef>
+          <a:effectRef idx="0">
+            <a:schemeClr val="accent1"/>
+          </a:effectRef>
+          <a:fontRef idx="minor">
+            <a:schemeClr val="tx1"/>
+          </a:fontRef>
+        </p:style>
+      </p:cxnSp>
+      <p:cxnSp>
+        <p:nvCxnSpPr>
+          <p:cNvPr id="52" name="Curved Connector 51"/>
+          <p:cNvCxnSpPr>
+            <a:stCxn id="24" idx="2"/>
+            <a:endCxn id="27" idx="0"/>
+          </p:cNvCxnSpPr>
+          <p:nvPr/>
+        </p:nvCxnSpPr>
+        <p:spPr>
+          <a:xfrm rot="5400000">
+            <a:off x="5112194" y="4925035"/>
+            <a:ext cx="210185" cy="906"/>
+          </a:xfrm>
+          <a:prstGeom prst="curvedConnector3">
+            <a:avLst>
+              <a:gd name="adj1" fmla="val 50000"/>
+            </a:avLst>
+          </a:prstGeom>
+          <a:ln w="28575">
+            <a:solidFill>
+              <a:schemeClr val="tx1"/>
+            </a:solidFill>
+            <a:tailEnd type="triangle"/>
+          </a:ln>
+        </p:spPr>
+        <p:style>
+          <a:lnRef idx="1">
+            <a:schemeClr val="accent1"/>
+          </a:lnRef>
+          <a:fillRef idx="0">
+            <a:schemeClr val="accent1"/>
+          </a:fillRef>
+          <a:effectRef idx="0">
+            <a:schemeClr val="accent1"/>
+          </a:effectRef>
+          <a:fontRef idx="minor">
+            <a:schemeClr val="tx1"/>
+          </a:fontRef>
+        </p:style>
+      </p:cxnSp>
+      <p:cxnSp>
+        <p:nvCxnSpPr>
+          <p:cNvPr id="56" name="Curved Connector 55"/>
+          <p:cNvCxnSpPr>
+            <a:stCxn id="27" idx="3"/>
+            <a:endCxn id="28" idx="3"/>
+          </p:cNvCxnSpPr>
+          <p:nvPr/>
+        </p:nvCxnSpPr>
+        <p:spPr>
+          <a:xfrm flipH="1">
+            <a:off x="6241725" y="5315086"/>
+            <a:ext cx="190029" cy="995012"/>
+          </a:xfrm>
+          <a:prstGeom prst="curvedConnector3">
+            <a:avLst>
+              <a:gd name="adj1" fmla="val -120297"/>
+            </a:avLst>
+          </a:prstGeom>
+          <a:ln w="28575">
+            <a:solidFill>
+              <a:schemeClr val="tx1"/>
+            </a:solidFill>
+            <a:tailEnd type="triangle"/>
+          </a:ln>
+        </p:spPr>
+        <p:style>
+          <a:lnRef idx="1">
+            <a:schemeClr val="accent1"/>
+          </a:lnRef>
+          <a:fillRef idx="0">
+            <a:schemeClr val="accent1"/>
+          </a:fillRef>
+          <a:effectRef idx="0">
+            <a:schemeClr val="accent1"/>
+          </a:effectRef>
+          <a:fontRef idx="minor">
+            <a:schemeClr val="tx1"/>
+          </a:fontRef>
+        </p:style>
+      </p:cxnSp>
+      <p:sp>
+        <p:nvSpPr>
+          <p:cNvPr id="64" name="TextBox 63"/>
+          <p:cNvSpPr txBox="1"/>
+          <p:nvPr/>
+        </p:nvSpPr>
+        <p:spPr>
+          <a:xfrm>
+            <a:off x="7468033" y="157942"/>
+            <a:ext cx="3234732" cy="369332"/>
+          </a:xfrm>
+          <a:prstGeom prst="rect">
+            <a:avLst/>
+          </a:prstGeom>
+          <a:noFill/>
+          <a:ln>
+            <a:noFill/>
+          </a:ln>
+        </p:spPr>
+        <p:txBody>
+          <a:bodyPr wrap="none" rtlCol="0">
+            <a:spAutoFit/>
+          </a:bodyPr>
+          <a:lstStyle/>
+          <a:p>
+            <a:r>
               <a:rPr lang="en-ZA" dirty="0" smtClean="0">
                 <a:solidFill>
-                  <a:schemeClr val="accent1"/>
-                </a:solidFill>
-              </a:rPr>
-              <a:t>Simulation</a:t>
+                  <a:srgbClr val="ED7D31"/>
+                </a:solidFill>
+              </a:rPr>
+              <a:t>Offline Modelling and Prediction</a:t>
             </a:r>
             <a:endParaRPr lang="en-ZA" dirty="0">
               <a:solidFill>
-                <a:schemeClr val="accent1"/>
+                <a:srgbClr val="ED7D31"/>
+              </a:solidFill>
+            </a:endParaRPr>
+          </a:p>
+        </p:txBody>
+      </p:sp>
+      <p:sp>
+        <p:nvSpPr>
+          <p:cNvPr id="65" name="TextBox 64"/>
+          <p:cNvSpPr txBox="1"/>
+          <p:nvPr/>
+        </p:nvSpPr>
+        <p:spPr>
+          <a:xfrm>
+            <a:off x="7468033" y="622018"/>
+            <a:ext cx="1539139" cy="307777"/>
+          </a:xfrm>
+          <a:prstGeom prst="rect">
+            <a:avLst/>
+          </a:prstGeom>
+          <a:noFill/>
+        </p:spPr>
+        <p:txBody>
+          <a:bodyPr wrap="none" rtlCol="0">
+            <a:spAutoFit/>
+          </a:bodyPr>
+          <a:lstStyle/>
+          <a:p>
+            <a:r>
+              <a:rPr lang="en-ZA" sz="1400" b="1" dirty="0" smtClean="0">
+                <a:solidFill>
+                  <a:schemeClr val="accent2"/>
+                </a:solidFill>
+              </a:rPr>
+              <a:t>Phase Assignment</a:t>
+            </a:r>
+            <a:endParaRPr lang="en-ZA" sz="1400" b="1" dirty="0">
+              <a:solidFill>
+                <a:schemeClr val="accent2"/>
+              </a:solidFill>
+            </a:endParaRPr>
+          </a:p>
+        </p:txBody>
+      </p:sp>
+      <p:sp>
+        <p:nvSpPr>
+          <p:cNvPr id="66" name="Rounded Rectangle 65"/>
+          <p:cNvSpPr/>
+          <p:nvPr/>
+        </p:nvSpPr>
+        <p:spPr>
+          <a:xfrm>
+            <a:off x="8725611" y="1024539"/>
+            <a:ext cx="1851626" cy="326324"/>
+          </a:xfrm>
+          <a:prstGeom prst="roundRect">
+            <a:avLst/>
+          </a:prstGeom>
+          <a:noFill/>
+          <a:ln>
+            <a:solidFill>
+              <a:schemeClr val="bg2">
+                <a:lumMod val="75000"/>
+              </a:schemeClr>
+            </a:solidFill>
+          </a:ln>
+        </p:spPr>
+        <p:style>
+          <a:lnRef idx="2">
+            <a:schemeClr val="accent1">
+              <a:shade val="50000"/>
+            </a:schemeClr>
+          </a:lnRef>
+          <a:fillRef idx="1">
+            <a:schemeClr val="accent1"/>
+          </a:fillRef>
+          <a:effectRef idx="0">
+            <a:schemeClr val="accent1"/>
+          </a:effectRef>
+          <a:fontRef idx="minor">
+            <a:schemeClr val="lt1"/>
+          </a:fontRef>
+        </p:style>
+        <p:txBody>
+          <a:bodyPr rtlCol="0" anchor="ctr"/>
+          <a:lstStyle/>
+          <a:p>
+            <a:pPr algn="ctr"/>
+            <a:r>
+              <a:rPr lang="en-ZA" sz="1100" b="1" dirty="0" smtClean="0">
+                <a:solidFill>
+                  <a:schemeClr val="tx1"/>
+                </a:solidFill>
+              </a:rPr>
+              <a:t>Online New Sample</a:t>
+            </a:r>
+            <a:endParaRPr lang="en-ZA" sz="1100" b="1" dirty="0">
+              <a:solidFill>
+                <a:schemeClr val="tx1"/>
+              </a:solidFill>
+            </a:endParaRPr>
+          </a:p>
+        </p:txBody>
+      </p:sp>
+      <p:sp>
+        <p:nvSpPr>
+          <p:cNvPr id="68" name="Rounded Rectangle 67"/>
+          <p:cNvSpPr/>
+          <p:nvPr/>
+        </p:nvSpPr>
+        <p:spPr>
+          <a:xfrm>
+            <a:off x="7565526" y="1713491"/>
+            <a:ext cx="2030837" cy="535781"/>
+          </a:xfrm>
+          <a:prstGeom prst="roundRect">
+            <a:avLst/>
+          </a:prstGeom>
+          <a:noFill/>
+          <a:ln>
+            <a:solidFill>
+              <a:schemeClr val="bg2">
+                <a:lumMod val="75000"/>
+              </a:schemeClr>
+            </a:solidFill>
+          </a:ln>
+        </p:spPr>
+        <p:style>
+          <a:lnRef idx="2">
+            <a:schemeClr val="accent1">
+              <a:shade val="50000"/>
+            </a:schemeClr>
+          </a:lnRef>
+          <a:fillRef idx="1">
+            <a:schemeClr val="accent1"/>
+          </a:fillRef>
+          <a:effectRef idx="0">
+            <a:schemeClr val="accent1"/>
+          </a:effectRef>
+          <a:fontRef idx="minor">
+            <a:schemeClr val="lt1"/>
+          </a:fontRef>
+        </p:style>
+        <p:txBody>
+          <a:bodyPr rtlCol="0" anchor="ctr"/>
+          <a:lstStyle/>
+          <a:p>
+            <a:pPr algn="ctr"/>
+            <a:r>
+              <a:rPr lang="en-ZA" sz="1100" dirty="0" smtClean="0">
+                <a:solidFill>
+                  <a:schemeClr val="tx1"/>
+                </a:solidFill>
+              </a:rPr>
+              <a:t>Calculate </a:t>
+            </a:r>
+            <a:r>
+              <a:rPr lang="en-ZA" sz="1100" b="1" dirty="0" smtClean="0">
+                <a:solidFill>
+                  <a:schemeClr val="tx1"/>
+                </a:solidFill>
+              </a:rPr>
+              <a:t>posterior probability </a:t>
+            </a:r>
+            <a:r>
+              <a:rPr lang="en-ZA" sz="1100" dirty="0" smtClean="0">
+                <a:solidFill>
+                  <a:schemeClr val="tx1"/>
+                </a:solidFill>
+              </a:rPr>
+              <a:t>to identify phase </a:t>
+            </a:r>
+            <a:endParaRPr lang="en-ZA" sz="1100" dirty="0">
+              <a:solidFill>
+                <a:schemeClr val="tx1"/>
+              </a:solidFill>
+            </a:endParaRPr>
+          </a:p>
+        </p:txBody>
+      </p:sp>
+      <p:cxnSp>
+        <p:nvCxnSpPr>
+          <p:cNvPr id="69" name="Curved Connector 68"/>
+          <p:cNvCxnSpPr>
+            <a:stCxn id="66" idx="1"/>
+            <a:endCxn id="68" idx="0"/>
+          </p:cNvCxnSpPr>
+          <p:nvPr/>
+        </p:nvCxnSpPr>
+        <p:spPr>
+          <a:xfrm rot="10800000" flipV="1">
+            <a:off x="8580945" y="1187701"/>
+            <a:ext cx="144666" cy="525790"/>
+          </a:xfrm>
+          <a:prstGeom prst="curvedConnector2">
+            <a:avLst/>
+          </a:prstGeom>
+          <a:ln w="28575">
+            <a:solidFill>
+              <a:schemeClr val="tx1"/>
+            </a:solidFill>
+            <a:tailEnd type="triangle"/>
+          </a:ln>
+        </p:spPr>
+        <p:style>
+          <a:lnRef idx="1">
+            <a:schemeClr val="accent1"/>
+          </a:lnRef>
+          <a:fillRef idx="0">
+            <a:schemeClr val="accent1"/>
+          </a:fillRef>
+          <a:effectRef idx="0">
+            <a:schemeClr val="accent1"/>
+          </a:effectRef>
+          <a:fontRef idx="minor">
+            <a:schemeClr val="tx1"/>
+          </a:fontRef>
+        </p:style>
+      </p:cxnSp>
+      <p:sp>
+        <p:nvSpPr>
+          <p:cNvPr id="73" name="Rounded Rectangle 72"/>
+          <p:cNvSpPr/>
+          <p:nvPr/>
+        </p:nvSpPr>
+        <p:spPr>
+          <a:xfrm>
+            <a:off x="7520683" y="2642738"/>
+            <a:ext cx="1455607" cy="384022"/>
+          </a:xfrm>
+          <a:prstGeom prst="roundRect">
+            <a:avLst/>
+          </a:prstGeom>
+          <a:noFill/>
+          <a:ln>
+            <a:solidFill>
+              <a:schemeClr val="bg2">
+                <a:lumMod val="75000"/>
+              </a:schemeClr>
+            </a:solidFill>
+          </a:ln>
+        </p:spPr>
+        <p:style>
+          <a:lnRef idx="2">
+            <a:schemeClr val="accent1">
+              <a:shade val="50000"/>
+            </a:schemeClr>
+          </a:lnRef>
+          <a:fillRef idx="1">
+            <a:schemeClr val="accent1"/>
+          </a:fillRef>
+          <a:effectRef idx="0">
+            <a:schemeClr val="accent1"/>
+          </a:effectRef>
+          <a:fontRef idx="minor">
+            <a:schemeClr val="lt1"/>
+          </a:fontRef>
+        </p:style>
+        <p:txBody>
+          <a:bodyPr rtlCol="0" anchor="ctr"/>
+          <a:lstStyle/>
+          <a:p>
+            <a:pPr algn="ctr"/>
+            <a:r>
+              <a:rPr lang="en-ZA" sz="1100" b="1" dirty="0" smtClean="0">
+                <a:solidFill>
+                  <a:schemeClr val="tx1"/>
+                </a:solidFill>
+              </a:rPr>
+              <a:t>Steady </a:t>
+            </a:r>
+            <a:r>
+              <a:rPr lang="en-ZA" sz="1100" dirty="0" smtClean="0">
+                <a:solidFill>
+                  <a:schemeClr val="tx1"/>
+                </a:solidFill>
+              </a:rPr>
+              <a:t>Phase</a:t>
+            </a:r>
+            <a:endParaRPr lang="en-ZA" sz="1100" dirty="0">
+              <a:solidFill>
+                <a:schemeClr val="tx1"/>
+              </a:solidFill>
+            </a:endParaRPr>
+          </a:p>
+        </p:txBody>
+      </p:sp>
+      <p:cxnSp>
+        <p:nvCxnSpPr>
+          <p:cNvPr id="74" name="Curved Connector 73"/>
+          <p:cNvCxnSpPr>
+            <a:stCxn id="68" idx="2"/>
+            <a:endCxn id="73" idx="0"/>
+          </p:cNvCxnSpPr>
+          <p:nvPr/>
+        </p:nvCxnSpPr>
+        <p:spPr>
+          <a:xfrm rot="5400000">
+            <a:off x="8217983" y="2279776"/>
+            <a:ext cx="393466" cy="332458"/>
+          </a:xfrm>
+          <a:prstGeom prst="curvedConnector3">
+            <a:avLst>
+              <a:gd name="adj1" fmla="val 50000"/>
+            </a:avLst>
+          </a:prstGeom>
+          <a:ln w="28575">
+            <a:solidFill>
+              <a:schemeClr val="tx1"/>
+            </a:solidFill>
+            <a:tailEnd type="triangle"/>
+          </a:ln>
+        </p:spPr>
+        <p:style>
+          <a:lnRef idx="1">
+            <a:schemeClr val="accent1"/>
+          </a:lnRef>
+          <a:fillRef idx="0">
+            <a:schemeClr val="accent1"/>
+          </a:fillRef>
+          <a:effectRef idx="0">
+            <a:schemeClr val="accent1"/>
+          </a:effectRef>
+          <a:fontRef idx="minor">
+            <a:schemeClr val="tx1"/>
+          </a:fontRef>
+        </p:style>
+      </p:cxnSp>
+      <p:sp>
+        <p:nvSpPr>
+          <p:cNvPr id="90" name="Rounded Rectangle 89"/>
+          <p:cNvSpPr/>
+          <p:nvPr/>
+        </p:nvSpPr>
+        <p:spPr>
+          <a:xfrm>
+            <a:off x="9121630" y="2625838"/>
+            <a:ext cx="1455607" cy="384022"/>
+          </a:xfrm>
+          <a:prstGeom prst="roundRect">
+            <a:avLst/>
+          </a:prstGeom>
+          <a:noFill/>
+          <a:ln>
+            <a:solidFill>
+              <a:schemeClr val="bg2">
+                <a:lumMod val="75000"/>
+              </a:schemeClr>
+            </a:solidFill>
+          </a:ln>
+        </p:spPr>
+        <p:style>
+          <a:lnRef idx="2">
+            <a:schemeClr val="accent1">
+              <a:shade val="50000"/>
+            </a:schemeClr>
+          </a:lnRef>
+          <a:fillRef idx="1">
+            <a:schemeClr val="accent1"/>
+          </a:fillRef>
+          <a:effectRef idx="0">
+            <a:schemeClr val="accent1"/>
+          </a:effectRef>
+          <a:fontRef idx="minor">
+            <a:schemeClr val="lt1"/>
+          </a:fontRef>
+        </p:style>
+        <p:txBody>
+          <a:bodyPr rtlCol="0" anchor="ctr"/>
+          <a:lstStyle/>
+          <a:p>
+            <a:pPr algn="ctr"/>
+            <a:r>
+              <a:rPr lang="en-ZA" sz="1100" b="1" dirty="0" smtClean="0">
+                <a:solidFill>
+                  <a:schemeClr val="tx1"/>
+                </a:solidFill>
+              </a:rPr>
+              <a:t>Fuzzy </a:t>
+            </a:r>
+            <a:r>
+              <a:rPr lang="en-ZA" sz="1100" dirty="0" smtClean="0">
+                <a:solidFill>
+                  <a:schemeClr val="tx1"/>
+                </a:solidFill>
+              </a:rPr>
+              <a:t>Phase</a:t>
+            </a:r>
+            <a:endParaRPr lang="en-ZA" sz="1100" dirty="0">
+              <a:solidFill>
+                <a:schemeClr val="tx1"/>
+              </a:solidFill>
+            </a:endParaRPr>
+          </a:p>
+        </p:txBody>
+      </p:sp>
+      <p:cxnSp>
+        <p:nvCxnSpPr>
+          <p:cNvPr id="91" name="Curved Connector 90"/>
+          <p:cNvCxnSpPr>
+            <a:stCxn id="68" idx="2"/>
+            <a:endCxn id="90" idx="0"/>
+          </p:cNvCxnSpPr>
+          <p:nvPr/>
+        </p:nvCxnSpPr>
+        <p:spPr>
+          <a:xfrm rot="16200000" flipH="1">
+            <a:off x="9026906" y="1803310"/>
+            <a:ext cx="376566" cy="1268489"/>
+          </a:xfrm>
+          <a:prstGeom prst="curvedConnector3">
+            <a:avLst>
+              <a:gd name="adj1" fmla="val 50000"/>
+            </a:avLst>
+          </a:prstGeom>
+          <a:ln w="28575">
+            <a:solidFill>
+              <a:schemeClr val="tx1"/>
+            </a:solidFill>
+            <a:tailEnd type="triangle"/>
+          </a:ln>
+        </p:spPr>
+        <p:style>
+          <a:lnRef idx="1">
+            <a:schemeClr val="accent1"/>
+          </a:lnRef>
+          <a:fillRef idx="0">
+            <a:schemeClr val="accent1"/>
+          </a:fillRef>
+          <a:effectRef idx="0">
+            <a:schemeClr val="accent1"/>
+          </a:effectRef>
+          <a:fontRef idx="minor">
+            <a:schemeClr val="tx1"/>
+          </a:fontRef>
+        </p:style>
+      </p:cxnSp>
+      <p:sp>
+        <p:nvSpPr>
+          <p:cNvPr id="94" name="Rounded Rectangle 93"/>
+          <p:cNvSpPr/>
+          <p:nvPr/>
+        </p:nvSpPr>
+        <p:spPr>
+          <a:xfrm>
+            <a:off x="7520683" y="3819629"/>
+            <a:ext cx="1455607" cy="580806"/>
+          </a:xfrm>
+          <a:prstGeom prst="roundRect">
+            <a:avLst/>
+          </a:prstGeom>
+          <a:noFill/>
+          <a:ln>
+            <a:solidFill>
+              <a:schemeClr val="bg2">
+                <a:lumMod val="75000"/>
+              </a:schemeClr>
+            </a:solidFill>
+          </a:ln>
+        </p:spPr>
+        <p:style>
+          <a:lnRef idx="2">
+            <a:schemeClr val="accent1">
+              <a:shade val="50000"/>
+            </a:schemeClr>
+          </a:lnRef>
+          <a:fillRef idx="1">
+            <a:schemeClr val="accent1"/>
+          </a:fillRef>
+          <a:effectRef idx="0">
+            <a:schemeClr val="accent1"/>
+          </a:effectRef>
+          <a:fontRef idx="minor">
+            <a:schemeClr val="lt1"/>
+          </a:fontRef>
+        </p:style>
+        <p:txBody>
+          <a:bodyPr rtlCol="0" anchor="ctr"/>
+          <a:lstStyle/>
+          <a:p>
+            <a:pPr algn="ctr"/>
+            <a:r>
+              <a:rPr lang="en-ZA" sz="1100" b="1" dirty="0" smtClean="0">
+                <a:solidFill>
+                  <a:schemeClr val="tx1"/>
+                </a:solidFill>
+              </a:rPr>
+              <a:t>Invoke Local Model</a:t>
+            </a:r>
+            <a:r>
+              <a:rPr lang="en-ZA" sz="1100" dirty="0" smtClean="0">
+                <a:solidFill>
+                  <a:schemeClr val="tx1"/>
+                </a:solidFill>
+              </a:rPr>
+              <a:t> to predict final quality</a:t>
+            </a:r>
+            <a:endParaRPr lang="en-ZA" sz="1100" b="1" dirty="0" smtClean="0">
+              <a:solidFill>
+                <a:schemeClr val="tx1"/>
+              </a:solidFill>
+            </a:endParaRPr>
+          </a:p>
+        </p:txBody>
+      </p:sp>
+      <p:sp>
+        <p:nvSpPr>
+          <p:cNvPr id="95" name="Rounded Rectangle 94"/>
+          <p:cNvSpPr/>
+          <p:nvPr/>
+        </p:nvSpPr>
+        <p:spPr>
+          <a:xfrm>
+            <a:off x="9038125" y="3819629"/>
+            <a:ext cx="1785046" cy="580806"/>
+          </a:xfrm>
+          <a:prstGeom prst="roundRect">
+            <a:avLst/>
+          </a:prstGeom>
+          <a:noFill/>
+          <a:ln>
+            <a:solidFill>
+              <a:schemeClr val="bg2">
+                <a:lumMod val="75000"/>
+              </a:schemeClr>
+            </a:solidFill>
+          </a:ln>
+        </p:spPr>
+        <p:style>
+          <a:lnRef idx="2">
+            <a:schemeClr val="accent1">
+              <a:shade val="50000"/>
+            </a:schemeClr>
+          </a:lnRef>
+          <a:fillRef idx="1">
+            <a:schemeClr val="accent1"/>
+          </a:fillRef>
+          <a:effectRef idx="0">
+            <a:schemeClr val="accent1"/>
+          </a:effectRef>
+          <a:fontRef idx="minor">
+            <a:schemeClr val="lt1"/>
+          </a:fontRef>
+        </p:style>
+        <p:txBody>
+          <a:bodyPr rtlCol="0" anchor="ctr"/>
+          <a:lstStyle/>
+          <a:p>
+            <a:pPr algn="ctr"/>
+            <a:r>
+              <a:rPr lang="en-ZA" sz="1100" b="1" dirty="0" smtClean="0">
+                <a:solidFill>
+                  <a:schemeClr val="tx1"/>
+                </a:solidFill>
+              </a:rPr>
+              <a:t>Bayesian Model Averaging </a:t>
+            </a:r>
+            <a:r>
+              <a:rPr lang="en-ZA" sz="1100" dirty="0" smtClean="0">
+                <a:solidFill>
+                  <a:schemeClr val="tx1"/>
+                </a:solidFill>
+              </a:rPr>
+              <a:t>for adjacent local models</a:t>
+            </a:r>
+            <a:endParaRPr lang="en-ZA" sz="1100" b="1" dirty="0" smtClean="0">
+              <a:solidFill>
+                <a:schemeClr val="tx1"/>
+              </a:solidFill>
+            </a:endParaRPr>
+          </a:p>
+        </p:txBody>
+      </p:sp>
+      <p:cxnSp>
+        <p:nvCxnSpPr>
+          <p:cNvPr id="96" name="Curved Connector 95"/>
+          <p:cNvCxnSpPr>
+            <a:stCxn id="73" idx="2"/>
+            <a:endCxn id="94" idx="0"/>
+          </p:cNvCxnSpPr>
+          <p:nvPr/>
+        </p:nvCxnSpPr>
+        <p:spPr>
+          <a:xfrm rot="5400000">
+            <a:off x="7852053" y="3423194"/>
+            <a:ext cx="792869" cy="12700"/>
+          </a:xfrm>
+          <a:prstGeom prst="curvedConnector3">
+            <a:avLst>
+              <a:gd name="adj1" fmla="val 50000"/>
+            </a:avLst>
+          </a:prstGeom>
+          <a:ln w="28575">
+            <a:solidFill>
+              <a:schemeClr val="tx1"/>
+            </a:solidFill>
+            <a:tailEnd type="triangle"/>
+          </a:ln>
+        </p:spPr>
+        <p:style>
+          <a:lnRef idx="1">
+            <a:schemeClr val="accent1"/>
+          </a:lnRef>
+          <a:fillRef idx="0">
+            <a:schemeClr val="accent1"/>
+          </a:fillRef>
+          <a:effectRef idx="0">
+            <a:schemeClr val="accent1"/>
+          </a:effectRef>
+          <a:fontRef idx="minor">
+            <a:schemeClr val="tx1"/>
+          </a:fontRef>
+        </p:style>
+      </p:cxnSp>
+      <p:cxnSp>
+        <p:nvCxnSpPr>
+          <p:cNvPr id="99" name="Curved Connector 98"/>
+          <p:cNvCxnSpPr>
+            <a:stCxn id="90" idx="2"/>
+            <a:endCxn id="95" idx="0"/>
+          </p:cNvCxnSpPr>
+          <p:nvPr/>
+        </p:nvCxnSpPr>
+        <p:spPr>
+          <a:xfrm rot="16200000" flipH="1">
+            <a:off x="9485157" y="3374137"/>
+            <a:ext cx="809769" cy="81214"/>
+          </a:xfrm>
+          <a:prstGeom prst="curvedConnector3">
+            <a:avLst>
+              <a:gd name="adj1" fmla="val 50000"/>
+            </a:avLst>
+          </a:prstGeom>
+          <a:ln w="28575">
+            <a:solidFill>
+              <a:schemeClr val="tx1"/>
+            </a:solidFill>
+            <a:tailEnd type="triangle"/>
+          </a:ln>
+        </p:spPr>
+        <p:style>
+          <a:lnRef idx="1">
+            <a:schemeClr val="accent1"/>
+          </a:lnRef>
+          <a:fillRef idx="0">
+            <a:schemeClr val="accent1"/>
+          </a:fillRef>
+          <a:effectRef idx="0">
+            <a:schemeClr val="accent1"/>
+          </a:effectRef>
+          <a:fontRef idx="minor">
+            <a:schemeClr val="tx1"/>
+          </a:fontRef>
+        </p:style>
+      </p:cxnSp>
+      <p:sp>
+        <p:nvSpPr>
+          <p:cNvPr id="104" name="Rounded Rectangle 103"/>
+          <p:cNvSpPr/>
+          <p:nvPr/>
+        </p:nvSpPr>
+        <p:spPr>
+          <a:xfrm>
+            <a:off x="8357595" y="4617748"/>
+            <a:ext cx="1455607" cy="580806"/>
+          </a:xfrm>
+          <a:prstGeom prst="roundRect">
+            <a:avLst/>
+          </a:prstGeom>
+          <a:noFill/>
+          <a:ln>
+            <a:solidFill>
+              <a:schemeClr val="bg2">
+                <a:lumMod val="75000"/>
+              </a:schemeClr>
+            </a:solidFill>
+          </a:ln>
+        </p:spPr>
+        <p:style>
+          <a:lnRef idx="2">
+            <a:schemeClr val="accent1">
+              <a:shade val="50000"/>
+            </a:schemeClr>
+          </a:lnRef>
+          <a:fillRef idx="1">
+            <a:schemeClr val="accent1"/>
+          </a:fillRef>
+          <a:effectRef idx="0">
+            <a:schemeClr val="accent1"/>
+          </a:effectRef>
+          <a:fontRef idx="minor">
+            <a:schemeClr val="lt1"/>
+          </a:fontRef>
+        </p:style>
+        <p:txBody>
+          <a:bodyPr rtlCol="0" anchor="ctr"/>
+          <a:lstStyle/>
+          <a:p>
+            <a:pPr algn="ctr"/>
+            <a:r>
+              <a:rPr lang="en-ZA" sz="1100" dirty="0" smtClean="0">
+                <a:solidFill>
+                  <a:schemeClr val="tx1"/>
+                </a:solidFill>
+              </a:rPr>
+              <a:t>Obtain output </a:t>
+            </a:r>
+            <a:r>
+              <a:rPr lang="en-ZA" sz="1100" b="1" dirty="0" smtClean="0">
+                <a:solidFill>
+                  <a:schemeClr val="tx1"/>
+                </a:solidFill>
+              </a:rPr>
+              <a:t>quality predictions</a:t>
+            </a:r>
+          </a:p>
+        </p:txBody>
+      </p:sp>
+      <p:cxnSp>
+        <p:nvCxnSpPr>
+          <p:cNvPr id="105" name="Curved Connector 104"/>
+          <p:cNvCxnSpPr>
+            <a:stCxn id="94" idx="2"/>
+          </p:cNvCxnSpPr>
+          <p:nvPr/>
+        </p:nvCxnSpPr>
+        <p:spPr>
+          <a:xfrm rot="16200000" flipH="1">
+            <a:off x="8236740" y="4412181"/>
+            <a:ext cx="234215" cy="210721"/>
+          </a:xfrm>
+          <a:prstGeom prst="curvedConnector3">
+            <a:avLst>
+              <a:gd name="adj1" fmla="val 50000"/>
+            </a:avLst>
+          </a:prstGeom>
+          <a:ln w="28575">
+            <a:solidFill>
+              <a:schemeClr val="tx1"/>
+            </a:solidFill>
+            <a:tailEnd type="triangle"/>
+          </a:ln>
+        </p:spPr>
+        <p:style>
+          <a:lnRef idx="1">
+            <a:schemeClr val="accent1"/>
+          </a:lnRef>
+          <a:fillRef idx="0">
+            <a:schemeClr val="accent1"/>
+          </a:fillRef>
+          <a:effectRef idx="0">
+            <a:schemeClr val="accent1"/>
+          </a:effectRef>
+          <a:fontRef idx="minor">
+            <a:schemeClr val="tx1"/>
+          </a:fontRef>
+        </p:style>
+      </p:cxnSp>
+      <p:cxnSp>
+        <p:nvCxnSpPr>
+          <p:cNvPr id="108" name="Curved Connector 107"/>
+          <p:cNvCxnSpPr>
+            <a:stCxn id="95" idx="2"/>
+          </p:cNvCxnSpPr>
+          <p:nvPr/>
+        </p:nvCxnSpPr>
+        <p:spPr>
+          <a:xfrm rot="5400000">
+            <a:off x="9689666" y="4402235"/>
+            <a:ext cx="242783" cy="239183"/>
+          </a:xfrm>
+          <a:prstGeom prst="curvedConnector3">
+            <a:avLst>
+              <a:gd name="adj1" fmla="val 50000"/>
+            </a:avLst>
+          </a:prstGeom>
+          <a:ln w="28575">
+            <a:solidFill>
+              <a:schemeClr val="tx1"/>
+            </a:solidFill>
+            <a:tailEnd type="triangle"/>
+          </a:ln>
+        </p:spPr>
+        <p:style>
+          <a:lnRef idx="1">
+            <a:schemeClr val="accent1"/>
+          </a:lnRef>
+          <a:fillRef idx="0">
+            <a:schemeClr val="accent1"/>
+          </a:fillRef>
+          <a:effectRef idx="0">
+            <a:schemeClr val="accent1"/>
+          </a:effectRef>
+          <a:fontRef idx="minor">
+            <a:schemeClr val="tx1"/>
+          </a:fontRef>
+        </p:style>
+      </p:cxnSp>
+      <p:cxnSp>
+        <p:nvCxnSpPr>
+          <p:cNvPr id="113" name="Curved Connector 112"/>
+          <p:cNvCxnSpPr>
+            <a:stCxn id="104" idx="3"/>
+            <a:endCxn id="66" idx="3"/>
+          </p:cNvCxnSpPr>
+          <p:nvPr/>
+        </p:nvCxnSpPr>
+        <p:spPr>
+          <a:xfrm flipV="1">
+            <a:off x="9813202" y="1187701"/>
+            <a:ext cx="764035" cy="3720450"/>
+          </a:xfrm>
+          <a:prstGeom prst="curvedConnector3">
+            <a:avLst>
+              <a:gd name="adj1" fmla="val 253952"/>
+            </a:avLst>
+          </a:prstGeom>
+          <a:ln w="28575">
+            <a:solidFill>
+              <a:schemeClr val="tx1"/>
+            </a:solidFill>
+            <a:tailEnd type="triangle"/>
+          </a:ln>
+        </p:spPr>
+        <p:style>
+          <a:lnRef idx="1">
+            <a:schemeClr val="accent1"/>
+          </a:lnRef>
+          <a:fillRef idx="0">
+            <a:schemeClr val="accent1"/>
+          </a:fillRef>
+          <a:effectRef idx="0">
+            <a:schemeClr val="accent1"/>
+          </a:effectRef>
+          <a:fontRef idx="minor">
+            <a:schemeClr val="tx1"/>
+          </a:fontRef>
+        </p:style>
+      </p:cxnSp>
+      <p:sp>
+        <p:nvSpPr>
+          <p:cNvPr id="117" name="Rounded Rectangle 116"/>
+          <p:cNvSpPr/>
+          <p:nvPr/>
+        </p:nvSpPr>
+        <p:spPr>
+          <a:xfrm>
+            <a:off x="8868560" y="5571606"/>
+            <a:ext cx="1062089" cy="453718"/>
+          </a:xfrm>
+          <a:prstGeom prst="roundRect">
+            <a:avLst/>
+          </a:prstGeom>
+          <a:noFill/>
+          <a:ln>
+            <a:solidFill>
+              <a:schemeClr val="bg2">
+                <a:lumMod val="75000"/>
+              </a:schemeClr>
+            </a:solidFill>
+          </a:ln>
+        </p:spPr>
+        <p:style>
+          <a:lnRef idx="2">
+            <a:schemeClr val="accent1">
+              <a:shade val="50000"/>
+            </a:schemeClr>
+          </a:lnRef>
+          <a:fillRef idx="1">
+            <a:schemeClr val="accent1"/>
+          </a:fillRef>
+          <a:effectRef idx="0">
+            <a:schemeClr val="accent1"/>
+          </a:effectRef>
+          <a:fontRef idx="minor">
+            <a:schemeClr val="lt1"/>
+          </a:fontRef>
+        </p:style>
+        <p:txBody>
+          <a:bodyPr rtlCol="0" anchor="ctr"/>
+          <a:lstStyle/>
+          <a:p>
+            <a:pPr algn="ctr"/>
+            <a:r>
+              <a:rPr lang="en-ZA" sz="1100" dirty="0" smtClean="0">
+                <a:solidFill>
+                  <a:schemeClr val="tx1"/>
+                </a:solidFill>
+              </a:rPr>
+              <a:t>Evaluate Performance</a:t>
+            </a:r>
+            <a:endParaRPr lang="en-ZA" sz="1100" b="1" dirty="0" smtClean="0">
+              <a:solidFill>
+                <a:schemeClr val="tx1"/>
+              </a:solidFill>
+            </a:endParaRPr>
+          </a:p>
+        </p:txBody>
+      </p:sp>
+      <p:cxnSp>
+        <p:nvCxnSpPr>
+          <p:cNvPr id="118" name="Curved Connector 117"/>
+          <p:cNvCxnSpPr>
+            <a:stCxn id="104" idx="2"/>
+            <a:endCxn id="117" idx="0"/>
+          </p:cNvCxnSpPr>
+          <p:nvPr/>
+        </p:nvCxnSpPr>
+        <p:spPr>
+          <a:xfrm rot="16200000" flipH="1">
+            <a:off x="9055976" y="5227977"/>
+            <a:ext cx="373052" cy="314206"/>
+          </a:xfrm>
+          <a:prstGeom prst="curvedConnector3">
+            <a:avLst>
+              <a:gd name="adj1" fmla="val 50000"/>
+            </a:avLst>
+          </a:prstGeom>
+          <a:ln w="28575">
+            <a:solidFill>
+              <a:schemeClr val="tx1"/>
+            </a:solidFill>
+            <a:tailEnd type="triangle"/>
+          </a:ln>
+        </p:spPr>
+        <p:style>
+          <a:lnRef idx="1">
+            <a:schemeClr val="accent1"/>
+          </a:lnRef>
+          <a:fillRef idx="0">
+            <a:schemeClr val="accent1"/>
+          </a:fillRef>
+          <a:effectRef idx="0">
+            <a:schemeClr val="accent1"/>
+          </a:effectRef>
+          <a:fontRef idx="minor">
+            <a:schemeClr val="tx1"/>
+          </a:fontRef>
+        </p:style>
+      </p:cxnSp>
+      <p:sp>
+        <p:nvSpPr>
+          <p:cNvPr id="125" name="Rounded Rectangle 124"/>
+          <p:cNvSpPr/>
+          <p:nvPr/>
+        </p:nvSpPr>
+        <p:spPr>
+          <a:xfrm>
+            <a:off x="10167221" y="6025324"/>
+            <a:ext cx="1062089" cy="453718"/>
+          </a:xfrm>
+          <a:prstGeom prst="roundRect">
+            <a:avLst/>
+          </a:prstGeom>
+          <a:noFill/>
+          <a:ln>
+            <a:solidFill>
+              <a:schemeClr val="bg2">
+                <a:lumMod val="75000"/>
+              </a:schemeClr>
+            </a:solidFill>
+          </a:ln>
+        </p:spPr>
+        <p:style>
+          <a:lnRef idx="2">
+            <a:schemeClr val="accent1">
+              <a:shade val="50000"/>
+            </a:schemeClr>
+          </a:lnRef>
+          <a:fillRef idx="1">
+            <a:schemeClr val="accent1"/>
+          </a:fillRef>
+          <a:effectRef idx="0">
+            <a:schemeClr val="accent1"/>
+          </a:effectRef>
+          <a:fontRef idx="minor">
+            <a:schemeClr val="lt1"/>
+          </a:fontRef>
+        </p:style>
+        <p:txBody>
+          <a:bodyPr rtlCol="0" anchor="ctr"/>
+          <a:lstStyle/>
+          <a:p>
+            <a:pPr algn="ctr"/>
+            <a:endParaRPr lang="en-ZA" sz="1100" b="1" dirty="0" smtClean="0">
+              <a:solidFill>
+                <a:schemeClr val="tx1"/>
+              </a:solidFill>
+            </a:endParaRPr>
+          </a:p>
+        </p:txBody>
+      </p:sp>
+      <p:cxnSp>
+        <p:nvCxnSpPr>
+          <p:cNvPr id="126" name="Curved Connector 125"/>
+          <p:cNvCxnSpPr>
+            <a:stCxn id="117" idx="2"/>
+            <a:endCxn id="125" idx="1"/>
+          </p:cNvCxnSpPr>
+          <p:nvPr/>
+        </p:nvCxnSpPr>
+        <p:spPr>
+          <a:xfrm rot="16200000" flipH="1">
+            <a:off x="9669984" y="5754945"/>
+            <a:ext cx="226859" cy="767616"/>
+          </a:xfrm>
+          <a:prstGeom prst="curvedConnector2">
+            <a:avLst/>
+          </a:prstGeom>
+          <a:ln w="28575">
+            <a:solidFill>
+              <a:schemeClr val="tx1"/>
+            </a:solidFill>
+            <a:tailEnd type="triangle"/>
+          </a:ln>
+        </p:spPr>
+        <p:style>
+          <a:lnRef idx="1">
+            <a:schemeClr val="accent1"/>
+          </a:lnRef>
+          <a:fillRef idx="0">
+            <a:schemeClr val="accent1"/>
+          </a:fillRef>
+          <a:effectRef idx="0">
+            <a:schemeClr val="accent1"/>
+          </a:effectRef>
+          <a:fontRef idx="minor">
+            <a:schemeClr val="tx1"/>
+          </a:fontRef>
+        </p:style>
+      </p:cxnSp>
+      <p:sp>
+        <p:nvSpPr>
+          <p:cNvPr id="131" name="TextBox 130"/>
+          <p:cNvSpPr txBox="1"/>
+          <p:nvPr/>
+        </p:nvSpPr>
+        <p:spPr>
+          <a:xfrm>
+            <a:off x="7468032" y="3403195"/>
+            <a:ext cx="1534010" cy="307777"/>
+          </a:xfrm>
+          <a:prstGeom prst="rect">
+            <a:avLst/>
+          </a:prstGeom>
+          <a:noFill/>
+        </p:spPr>
+        <p:txBody>
+          <a:bodyPr wrap="none" rtlCol="0">
+            <a:spAutoFit/>
+          </a:bodyPr>
+          <a:lstStyle/>
+          <a:p>
+            <a:r>
+              <a:rPr lang="en-ZA" sz="1400" b="1" dirty="0" smtClean="0">
+                <a:solidFill>
+                  <a:schemeClr val="accent2"/>
+                </a:solidFill>
+              </a:rPr>
+              <a:t>Quality Prediction</a:t>
+            </a:r>
+            <a:endParaRPr lang="en-ZA" sz="1400" b="1" dirty="0">
+              <a:solidFill>
+                <a:schemeClr val="accent2"/>
               </a:solidFill>
             </a:endParaRPr>
           </a:p>

</xml_diff>